<commit_message>
add this website for try.
</commit_message>
<xml_diff>
--- a/doc/wireframe.pptx
+++ b/doc/wireframe.pptx
@@ -201,7 +201,7 @@
           <a:p>
             <a:fld id="{13B2DAF2-BD77-584D-ADD5-AD9CFA98BA5C}" type="datetimeFigureOut">
               <a:rPr lang="en-US" smtClean="0"/>
-              <a:t>9/24/21</a:t>
+              <a:t>10/27/21</a:t>
             </a:fld>
             <a:endParaRPr lang="en-US"/>
           </a:p>
@@ -699,7 +699,7 @@
           <a:p>
             <a:fld id="{5D41B4D0-D3ED-8D43-BD61-3AFF2E816EE8}" type="datetimeFigureOut">
               <a:rPr lang="en-US" smtClean="0"/>
-              <a:t>9/24/21</a:t>
+              <a:t>10/27/21</a:t>
             </a:fld>
             <a:endParaRPr lang="en-US"/>
           </a:p>
@@ -897,7 +897,7 @@
           <a:p>
             <a:fld id="{5D41B4D0-D3ED-8D43-BD61-3AFF2E816EE8}" type="datetimeFigureOut">
               <a:rPr lang="en-US" smtClean="0"/>
-              <a:t>9/24/21</a:t>
+              <a:t>10/27/21</a:t>
             </a:fld>
             <a:endParaRPr lang="en-US"/>
           </a:p>
@@ -1105,7 +1105,7 @@
           <a:p>
             <a:fld id="{5D41B4D0-D3ED-8D43-BD61-3AFF2E816EE8}" type="datetimeFigureOut">
               <a:rPr lang="en-US" smtClean="0"/>
-              <a:t>9/24/21</a:t>
+              <a:t>10/27/21</a:t>
             </a:fld>
             <a:endParaRPr lang="en-US"/>
           </a:p>
@@ -1303,7 +1303,7 @@
           <a:p>
             <a:fld id="{5D41B4D0-D3ED-8D43-BD61-3AFF2E816EE8}" type="datetimeFigureOut">
               <a:rPr lang="en-US" smtClean="0"/>
-              <a:t>9/24/21</a:t>
+              <a:t>10/27/21</a:t>
             </a:fld>
             <a:endParaRPr lang="en-US"/>
           </a:p>
@@ -1578,7 +1578,7 @@
           <a:p>
             <a:fld id="{5D41B4D0-D3ED-8D43-BD61-3AFF2E816EE8}" type="datetimeFigureOut">
               <a:rPr lang="en-US" smtClean="0"/>
-              <a:t>9/24/21</a:t>
+              <a:t>10/27/21</a:t>
             </a:fld>
             <a:endParaRPr lang="en-US"/>
           </a:p>
@@ -1843,7 +1843,7 @@
           <a:p>
             <a:fld id="{5D41B4D0-D3ED-8D43-BD61-3AFF2E816EE8}" type="datetimeFigureOut">
               <a:rPr lang="en-US" smtClean="0"/>
-              <a:t>9/24/21</a:t>
+              <a:t>10/27/21</a:t>
             </a:fld>
             <a:endParaRPr lang="en-US"/>
           </a:p>
@@ -2255,7 +2255,7 @@
           <a:p>
             <a:fld id="{5D41B4D0-D3ED-8D43-BD61-3AFF2E816EE8}" type="datetimeFigureOut">
               <a:rPr lang="en-US" smtClean="0"/>
-              <a:t>9/24/21</a:t>
+              <a:t>10/27/21</a:t>
             </a:fld>
             <a:endParaRPr lang="en-US"/>
           </a:p>
@@ -2396,7 +2396,7 @@
           <a:p>
             <a:fld id="{5D41B4D0-D3ED-8D43-BD61-3AFF2E816EE8}" type="datetimeFigureOut">
               <a:rPr lang="en-US" smtClean="0"/>
-              <a:t>9/24/21</a:t>
+              <a:t>10/27/21</a:t>
             </a:fld>
             <a:endParaRPr lang="en-US"/>
           </a:p>
@@ -2509,7 +2509,7 @@
           <a:p>
             <a:fld id="{5D41B4D0-D3ED-8D43-BD61-3AFF2E816EE8}" type="datetimeFigureOut">
               <a:rPr lang="en-US" smtClean="0"/>
-              <a:t>9/24/21</a:t>
+              <a:t>10/27/21</a:t>
             </a:fld>
             <a:endParaRPr lang="en-US"/>
           </a:p>
@@ -2820,7 +2820,7 @@
           <a:p>
             <a:fld id="{5D41B4D0-D3ED-8D43-BD61-3AFF2E816EE8}" type="datetimeFigureOut">
               <a:rPr lang="en-US" smtClean="0"/>
-              <a:t>9/24/21</a:t>
+              <a:t>10/27/21</a:t>
             </a:fld>
             <a:endParaRPr lang="en-US"/>
           </a:p>
@@ -3108,7 +3108,7 @@
           <a:p>
             <a:fld id="{5D41B4D0-D3ED-8D43-BD61-3AFF2E816EE8}" type="datetimeFigureOut">
               <a:rPr lang="en-US" smtClean="0"/>
-              <a:t>9/24/21</a:t>
+              <a:t>10/27/21</a:t>
             </a:fld>
             <a:endParaRPr lang="en-US"/>
           </a:p>
@@ -3349,7 +3349,7 @@
           <a:p>
             <a:fld id="{5D41B4D0-D3ED-8D43-BD61-3AFF2E816EE8}" type="datetimeFigureOut">
               <a:rPr lang="en-US" smtClean="0"/>
-              <a:t>9/24/21</a:t>
+              <a:t>10/27/21</a:t>
             </a:fld>
             <a:endParaRPr lang="en-US"/>
           </a:p>
@@ -4742,6 +4742,12 @@
             </a:r>
           </a:p>
           <a:p>
+            <a:r>
+              <a:rPr lang="en-US" dirty="0"/>
+              <a:t>Reservation System (booking conference room with time slot.) </a:t>
+            </a:r>
+          </a:p>
+          <a:p>
             <a:endParaRPr lang="en-US" dirty="0"/>
           </a:p>
           <a:p>
@@ -4830,40 +4836,741 @@
             <p:ph type="title"/>
           </p:nvPr>
         </p:nvSpPr>
-        <p:spPr/>
+        <p:spPr>
+          <a:xfrm>
+            <a:off x="251926" y="0"/>
+            <a:ext cx="10263673" cy="978281"/>
+          </a:xfrm>
+        </p:spPr>
         <p:txBody>
           <a:bodyPr/>
           <a:lstStyle/>
           <a:p>
+            <a:r>
+              <a:rPr lang="en-US" b="1" dirty="0"/>
+              <a:t>Website Structure</a:t>
+            </a:r>
+          </a:p>
+        </p:txBody>
+      </p:sp>
+      <p:pic>
+        <p:nvPicPr>
+          <p:cNvPr id="5" name="Picture 4" descr="A picture containing text, clipart&#10;&#10;Description automatically generated">
+            <a:extLst>
+              <a:ext uri="{FF2B5EF4-FFF2-40B4-BE49-F238E27FC236}">
+                <a16:creationId xmlns:a16="http://schemas.microsoft.com/office/drawing/2014/main" id="{A6B46804-B3BB-FB41-9324-03C89B594CEE}"/>
+              </a:ext>
+            </a:extLst>
+          </p:cNvPr>
+          <p:cNvPicPr>
+            <a:picLocks noChangeAspect="1"/>
+          </p:cNvPicPr>
+          <p:nvPr/>
+        </p:nvPicPr>
+        <p:blipFill>
+          <a:blip r:embed="rId2"/>
+          <a:stretch>
+            <a:fillRect/>
+          </a:stretch>
+        </p:blipFill>
+        <p:spPr>
+          <a:xfrm>
+            <a:off x="8603747" y="2417424"/>
+            <a:ext cx="2222054" cy="700963"/>
+          </a:xfrm>
+          <a:prstGeom prst="rect">
+            <a:avLst/>
+          </a:prstGeom>
+        </p:spPr>
+      </p:pic>
+      <p:pic>
+        <p:nvPicPr>
+          <p:cNvPr id="7" name="Picture 6" descr="A picture containing text, clipart&#10;&#10;Description automatically generated">
+            <a:extLst>
+              <a:ext uri="{FF2B5EF4-FFF2-40B4-BE49-F238E27FC236}">
+                <a16:creationId xmlns:a16="http://schemas.microsoft.com/office/drawing/2014/main" id="{FF2CDA48-AD36-7943-B684-FDAD4EEB98C1}"/>
+              </a:ext>
+            </a:extLst>
+          </p:cNvPr>
+          <p:cNvPicPr>
+            <a:picLocks noChangeAspect="1"/>
+          </p:cNvPicPr>
+          <p:nvPr/>
+        </p:nvPicPr>
+        <p:blipFill rotWithShape="1">
+          <a:blip r:embed="rId3"/>
+          <a:srcRect l="1772" t="7934" r="2623"/>
+          <a:stretch/>
+        </p:blipFill>
+        <p:spPr>
+          <a:xfrm>
+            <a:off x="8448729" y="1669272"/>
+            <a:ext cx="2311190" cy="568011"/>
+          </a:xfrm>
+          <a:prstGeom prst="rect">
+            <a:avLst/>
+          </a:prstGeom>
+        </p:spPr>
+      </p:pic>
+      <p:pic>
+        <p:nvPicPr>
+          <p:cNvPr id="9" name="Picture 8" descr="A green and white logo&#10;&#10;Description automatically generated with low confidence">
+            <a:extLst>
+              <a:ext uri="{FF2B5EF4-FFF2-40B4-BE49-F238E27FC236}">
+                <a16:creationId xmlns:a16="http://schemas.microsoft.com/office/drawing/2014/main" id="{6D1D1DDC-C9C5-3B4E-8812-B44A83A60A30}"/>
+              </a:ext>
+            </a:extLst>
+          </p:cNvPr>
+          <p:cNvPicPr>
+            <a:picLocks noChangeAspect="1"/>
+          </p:cNvPicPr>
+          <p:nvPr/>
+        </p:nvPicPr>
+        <p:blipFill>
+          <a:blip r:embed="rId4"/>
+          <a:stretch>
+            <a:fillRect/>
+          </a:stretch>
+        </p:blipFill>
+        <p:spPr>
+          <a:xfrm>
+            <a:off x="3292208" y="3946125"/>
+            <a:ext cx="2498200" cy="1002103"/>
+          </a:xfrm>
+          <a:prstGeom prst="rect">
+            <a:avLst/>
+          </a:prstGeom>
+        </p:spPr>
+      </p:pic>
+      <p:pic>
+        <p:nvPicPr>
+          <p:cNvPr id="11" name="Picture 10" descr="Logo&#10;&#10;Description automatically generated">
+            <a:extLst>
+              <a:ext uri="{FF2B5EF4-FFF2-40B4-BE49-F238E27FC236}">
+                <a16:creationId xmlns:a16="http://schemas.microsoft.com/office/drawing/2014/main" id="{020D259A-0F01-9B4E-A248-CA1C4EFFA7C3}"/>
+              </a:ext>
+            </a:extLst>
+          </p:cNvPr>
+          <p:cNvPicPr>
+            <a:picLocks noChangeAspect="1"/>
+          </p:cNvPicPr>
+          <p:nvPr/>
+        </p:nvPicPr>
+        <p:blipFill rotWithShape="1">
+          <a:blip r:embed="rId5"/>
+          <a:srcRect l="8177" t="15989" r="7547" b="16087"/>
+          <a:stretch/>
+        </p:blipFill>
+        <p:spPr>
+          <a:xfrm>
+            <a:off x="8519752" y="4597911"/>
+            <a:ext cx="2306049" cy="1239072"/>
+          </a:xfrm>
+          <a:prstGeom prst="rect">
+            <a:avLst/>
+          </a:prstGeom>
+        </p:spPr>
+      </p:pic>
+      <p:pic>
+        <p:nvPicPr>
+          <p:cNvPr id="13" name="Picture 12" descr="A picture containing logo&#10;&#10;Description automatically generated">
+            <a:extLst>
+              <a:ext uri="{FF2B5EF4-FFF2-40B4-BE49-F238E27FC236}">
+                <a16:creationId xmlns:a16="http://schemas.microsoft.com/office/drawing/2014/main" id="{39B49AF6-E452-3245-8AF3-4BC49E4C9324}"/>
+              </a:ext>
+            </a:extLst>
+          </p:cNvPr>
+          <p:cNvPicPr>
+            <a:picLocks noChangeAspect="1"/>
+          </p:cNvPicPr>
+          <p:nvPr/>
+        </p:nvPicPr>
+        <p:blipFill>
+          <a:blip r:embed="rId6"/>
+          <a:stretch>
+            <a:fillRect/>
+          </a:stretch>
+        </p:blipFill>
+        <p:spPr>
+          <a:xfrm>
+            <a:off x="3019204" y="1137963"/>
+            <a:ext cx="2010929" cy="944200"/>
+          </a:xfrm>
+          <a:prstGeom prst="rect">
+            <a:avLst/>
+          </a:prstGeom>
+        </p:spPr>
+      </p:pic>
+      <p:pic>
+        <p:nvPicPr>
+          <p:cNvPr id="15" name="Picture 14" descr="Icon&#10;&#10;Description automatically generated">
+            <a:extLst>
+              <a:ext uri="{FF2B5EF4-FFF2-40B4-BE49-F238E27FC236}">
+                <a16:creationId xmlns:a16="http://schemas.microsoft.com/office/drawing/2014/main" id="{24E79976-6A01-5849-9B70-C9E235247492}"/>
+              </a:ext>
+            </a:extLst>
+          </p:cNvPr>
+          <p:cNvPicPr>
+            <a:picLocks noChangeAspect="1"/>
+          </p:cNvPicPr>
+          <p:nvPr/>
+        </p:nvPicPr>
+        <p:blipFill rotWithShape="1">
+          <a:blip r:embed="rId7"/>
+          <a:srcRect r="6841"/>
+          <a:stretch/>
+        </p:blipFill>
+        <p:spPr>
+          <a:xfrm>
+            <a:off x="198790" y="946477"/>
+            <a:ext cx="2466581" cy="1445589"/>
+          </a:xfrm>
+          <a:prstGeom prst="rect">
+            <a:avLst/>
+          </a:prstGeom>
+        </p:spPr>
+      </p:pic>
+      <p:sp>
+        <p:nvSpPr>
+          <p:cNvPr id="16" name="Rectangle 15">
+            <a:extLst>
+              <a:ext uri="{FF2B5EF4-FFF2-40B4-BE49-F238E27FC236}">
+                <a16:creationId xmlns:a16="http://schemas.microsoft.com/office/drawing/2014/main" id="{6DD4D360-BBB7-F44E-AA3A-04B65E5CB211}"/>
+              </a:ext>
+            </a:extLst>
+          </p:cNvPr>
+          <p:cNvSpPr/>
+          <p:nvPr/>
+        </p:nvSpPr>
+        <p:spPr>
+          <a:xfrm>
+            <a:off x="2786980" y="978281"/>
+            <a:ext cx="8745657" cy="5422519"/>
+          </a:xfrm>
+          <a:prstGeom prst="rect">
+            <a:avLst/>
+          </a:prstGeom>
+          <a:noFill/>
+          <a:ln w="50800">
+            <a:solidFill>
+              <a:schemeClr val="tx1"/>
+            </a:solidFill>
+          </a:ln>
+        </p:spPr>
+        <p:style>
+          <a:lnRef idx="2">
+            <a:schemeClr val="accent1">
+              <a:shade val="50000"/>
+            </a:schemeClr>
+          </a:lnRef>
+          <a:fillRef idx="1">
+            <a:schemeClr val="accent1"/>
+          </a:fillRef>
+          <a:effectRef idx="0">
+            <a:schemeClr val="accent1"/>
+          </a:effectRef>
+          <a:fontRef idx="minor">
+            <a:schemeClr val="lt1"/>
+          </a:fontRef>
+        </p:style>
+        <p:txBody>
+          <a:bodyPr rtlCol="0" anchor="ctr"/>
+          <a:lstStyle/>
+          <a:p>
+            <a:pPr algn="ctr"/>
             <a:endParaRPr lang="en-US"/>
           </a:p>
         </p:txBody>
       </p:sp>
       <p:sp>
         <p:nvSpPr>
-          <p:cNvPr id="3" name="Content Placeholder 2">
-            <a:extLst>
-              <a:ext uri="{FF2B5EF4-FFF2-40B4-BE49-F238E27FC236}">
-                <a16:creationId xmlns:a16="http://schemas.microsoft.com/office/drawing/2014/main" id="{04F9FA9C-37AE-7442-99EC-4E9ECFA357D0}"/>
-              </a:ext>
-            </a:extLst>
-          </p:cNvPr>
-          <p:cNvSpPr>
-            <a:spLocks noGrp="1"/>
-          </p:cNvSpPr>
-          <p:nvPr>
-            <p:ph idx="1"/>
-          </p:nvPr>
-        </p:nvSpPr>
-        <p:spPr/>
-        <p:txBody>
-          <a:bodyPr/>
-          <a:lstStyle/>
-          <a:p>
-            <a:endParaRPr lang="en-US" dirty="0"/>
-          </a:p>
-        </p:txBody>
-      </p:sp>
+          <p:cNvPr id="17" name="TextBox 16">
+            <a:extLst>
+              <a:ext uri="{FF2B5EF4-FFF2-40B4-BE49-F238E27FC236}">
+                <a16:creationId xmlns:a16="http://schemas.microsoft.com/office/drawing/2014/main" id="{08E66D5D-95CC-6E45-9BDB-A7D0EFC2B3B4}"/>
+              </a:ext>
+            </a:extLst>
+          </p:cNvPr>
+          <p:cNvSpPr txBox="1"/>
+          <p:nvPr/>
+        </p:nvSpPr>
+        <p:spPr>
+          <a:xfrm>
+            <a:off x="3050597" y="1992940"/>
+            <a:ext cx="1963551" cy="400110"/>
+          </a:xfrm>
+          <a:prstGeom prst="rect">
+            <a:avLst/>
+          </a:prstGeom>
+          <a:noFill/>
+        </p:spPr>
+        <p:txBody>
+          <a:bodyPr wrap="none" rtlCol="0">
+            <a:spAutoFit/>
+          </a:bodyPr>
+          <a:lstStyle/>
+          <a:p>
+            <a:r>
+              <a:rPr lang="en-US" sz="2000" b="1" dirty="0"/>
+              <a:t>Docker-compose</a:t>
+            </a:r>
+          </a:p>
+        </p:txBody>
+      </p:sp>
+      <p:sp>
+        <p:nvSpPr>
+          <p:cNvPr id="18" name="TextBox 17">
+            <a:extLst>
+              <a:ext uri="{FF2B5EF4-FFF2-40B4-BE49-F238E27FC236}">
+                <a16:creationId xmlns:a16="http://schemas.microsoft.com/office/drawing/2014/main" id="{DE97686D-F41A-5142-9B60-F54C0325654D}"/>
+              </a:ext>
+            </a:extLst>
+          </p:cNvPr>
+          <p:cNvSpPr txBox="1"/>
+          <p:nvPr/>
+        </p:nvSpPr>
+        <p:spPr>
+          <a:xfrm>
+            <a:off x="7426459" y="1510080"/>
+            <a:ext cx="641138" cy="400110"/>
+          </a:xfrm>
+          <a:prstGeom prst="rect">
+            <a:avLst/>
+          </a:prstGeom>
+          <a:noFill/>
+        </p:spPr>
+        <p:txBody>
+          <a:bodyPr wrap="none" rtlCol="0">
+            <a:spAutoFit/>
+          </a:bodyPr>
+          <a:lstStyle/>
+          <a:p>
+            <a:r>
+              <a:rPr lang="en-US" sz="2000" b="1" dirty="0"/>
+              <a:t>web</a:t>
+            </a:r>
+          </a:p>
+        </p:txBody>
+      </p:sp>
+      <p:sp>
+        <p:nvSpPr>
+          <p:cNvPr id="19" name="Rectangle 18">
+            <a:extLst>
+              <a:ext uri="{FF2B5EF4-FFF2-40B4-BE49-F238E27FC236}">
+                <a16:creationId xmlns:a16="http://schemas.microsoft.com/office/drawing/2014/main" id="{9907C74A-386A-884C-931E-4667E9682499}"/>
+              </a:ext>
+            </a:extLst>
+          </p:cNvPr>
+          <p:cNvSpPr/>
+          <p:nvPr/>
+        </p:nvSpPr>
+        <p:spPr>
+          <a:xfrm>
+            <a:off x="8102513" y="1449718"/>
+            <a:ext cx="3140526" cy="1898813"/>
+          </a:xfrm>
+          <a:prstGeom prst="rect">
+            <a:avLst/>
+          </a:prstGeom>
+          <a:noFill/>
+          <a:ln w="50800">
+            <a:solidFill>
+              <a:schemeClr val="tx1"/>
+            </a:solidFill>
+          </a:ln>
+        </p:spPr>
+        <p:style>
+          <a:lnRef idx="2">
+            <a:schemeClr val="accent1">
+              <a:shade val="50000"/>
+            </a:schemeClr>
+          </a:lnRef>
+          <a:fillRef idx="1">
+            <a:schemeClr val="accent1"/>
+          </a:fillRef>
+          <a:effectRef idx="0">
+            <a:schemeClr val="accent1"/>
+          </a:effectRef>
+          <a:fontRef idx="minor">
+            <a:schemeClr val="lt1"/>
+          </a:fontRef>
+        </p:style>
+        <p:txBody>
+          <a:bodyPr rtlCol="0" anchor="ctr"/>
+          <a:lstStyle/>
+          <a:p>
+            <a:pPr algn="ctr"/>
+            <a:endParaRPr lang="en-US"/>
+          </a:p>
+        </p:txBody>
+      </p:sp>
+      <p:sp>
+        <p:nvSpPr>
+          <p:cNvPr id="20" name="Rectangle 19">
+            <a:extLst>
+              <a:ext uri="{FF2B5EF4-FFF2-40B4-BE49-F238E27FC236}">
+                <a16:creationId xmlns:a16="http://schemas.microsoft.com/office/drawing/2014/main" id="{4F086B46-8B12-3942-B1C0-130BE86AF706}"/>
+              </a:ext>
+            </a:extLst>
+          </p:cNvPr>
+          <p:cNvSpPr/>
+          <p:nvPr/>
+        </p:nvSpPr>
+        <p:spPr>
+          <a:xfrm>
+            <a:off x="3128513" y="3191067"/>
+            <a:ext cx="2804280" cy="1847461"/>
+          </a:xfrm>
+          <a:prstGeom prst="rect">
+            <a:avLst/>
+          </a:prstGeom>
+          <a:noFill/>
+          <a:ln w="50800">
+            <a:solidFill>
+              <a:schemeClr val="tx1"/>
+            </a:solidFill>
+          </a:ln>
+        </p:spPr>
+        <p:style>
+          <a:lnRef idx="2">
+            <a:schemeClr val="accent1">
+              <a:shade val="50000"/>
+            </a:schemeClr>
+          </a:lnRef>
+          <a:fillRef idx="1">
+            <a:schemeClr val="accent1"/>
+          </a:fillRef>
+          <a:effectRef idx="0">
+            <a:schemeClr val="accent1"/>
+          </a:effectRef>
+          <a:fontRef idx="minor">
+            <a:schemeClr val="lt1"/>
+          </a:fontRef>
+        </p:style>
+        <p:txBody>
+          <a:bodyPr rtlCol="0" anchor="ctr"/>
+          <a:lstStyle/>
+          <a:p>
+            <a:pPr algn="ctr"/>
+            <a:endParaRPr lang="en-US"/>
+          </a:p>
+        </p:txBody>
+      </p:sp>
+      <p:sp>
+        <p:nvSpPr>
+          <p:cNvPr id="21" name="Rectangle 20">
+            <a:extLst>
+              <a:ext uri="{FF2B5EF4-FFF2-40B4-BE49-F238E27FC236}">
+                <a16:creationId xmlns:a16="http://schemas.microsoft.com/office/drawing/2014/main" id="{23D1274D-3218-9C45-B758-EF72A7A0A304}"/>
+              </a:ext>
+            </a:extLst>
+          </p:cNvPr>
+          <p:cNvSpPr/>
+          <p:nvPr/>
+        </p:nvSpPr>
+        <p:spPr>
+          <a:xfrm>
+            <a:off x="8102514" y="4268040"/>
+            <a:ext cx="3140526" cy="1898813"/>
+          </a:xfrm>
+          <a:prstGeom prst="rect">
+            <a:avLst/>
+          </a:prstGeom>
+          <a:noFill/>
+          <a:ln w="50800">
+            <a:solidFill>
+              <a:schemeClr val="tx1"/>
+            </a:solidFill>
+          </a:ln>
+        </p:spPr>
+        <p:style>
+          <a:lnRef idx="2">
+            <a:schemeClr val="accent1">
+              <a:shade val="50000"/>
+            </a:schemeClr>
+          </a:lnRef>
+          <a:fillRef idx="1">
+            <a:schemeClr val="accent1"/>
+          </a:fillRef>
+          <a:effectRef idx="0">
+            <a:schemeClr val="accent1"/>
+          </a:effectRef>
+          <a:fontRef idx="minor">
+            <a:schemeClr val="lt1"/>
+          </a:fontRef>
+        </p:style>
+        <p:txBody>
+          <a:bodyPr rtlCol="0" anchor="ctr"/>
+          <a:lstStyle/>
+          <a:p>
+            <a:pPr algn="ctr"/>
+            <a:endParaRPr lang="en-US"/>
+          </a:p>
+        </p:txBody>
+      </p:sp>
+      <p:sp>
+        <p:nvSpPr>
+          <p:cNvPr id="22" name="TextBox 21">
+            <a:extLst>
+              <a:ext uri="{FF2B5EF4-FFF2-40B4-BE49-F238E27FC236}">
+                <a16:creationId xmlns:a16="http://schemas.microsoft.com/office/drawing/2014/main" id="{4EC02D72-6889-7E4F-9E57-1A36C5056938}"/>
+              </a:ext>
+            </a:extLst>
+          </p:cNvPr>
+          <p:cNvSpPr txBox="1"/>
+          <p:nvPr/>
+        </p:nvSpPr>
+        <p:spPr>
+          <a:xfrm>
+            <a:off x="7426459" y="4215904"/>
+            <a:ext cx="460382" cy="400110"/>
+          </a:xfrm>
+          <a:prstGeom prst="rect">
+            <a:avLst/>
+          </a:prstGeom>
+          <a:noFill/>
+        </p:spPr>
+        <p:txBody>
+          <a:bodyPr wrap="none" rtlCol="0">
+            <a:spAutoFit/>
+          </a:bodyPr>
+          <a:lstStyle/>
+          <a:p>
+            <a:r>
+              <a:rPr lang="en-US" sz="2000" b="1" dirty="0" err="1"/>
+              <a:t>db</a:t>
+            </a:r>
+            <a:endParaRPr lang="en-US" sz="2000" b="1" dirty="0"/>
+          </a:p>
+        </p:txBody>
+      </p:sp>
+      <p:sp>
+        <p:nvSpPr>
+          <p:cNvPr id="23" name="TextBox 22">
+            <a:extLst>
+              <a:ext uri="{FF2B5EF4-FFF2-40B4-BE49-F238E27FC236}">
+                <a16:creationId xmlns:a16="http://schemas.microsoft.com/office/drawing/2014/main" id="{8C553AFC-A03E-7742-B3CF-368365F7744A}"/>
+              </a:ext>
+            </a:extLst>
+          </p:cNvPr>
+          <p:cNvSpPr txBox="1"/>
+          <p:nvPr/>
+        </p:nvSpPr>
+        <p:spPr>
+          <a:xfrm>
+            <a:off x="3209079" y="2785420"/>
+            <a:ext cx="1523238" cy="400110"/>
+          </a:xfrm>
+          <a:prstGeom prst="rect">
+            <a:avLst/>
+          </a:prstGeom>
+          <a:noFill/>
+        </p:spPr>
+        <p:txBody>
+          <a:bodyPr wrap="none" rtlCol="0">
+            <a:spAutoFit/>
+          </a:bodyPr>
+          <a:lstStyle/>
+          <a:p>
+            <a:r>
+              <a:rPr lang="en-US" sz="2000" b="1" dirty="0"/>
+              <a:t>Proxy-server</a:t>
+            </a:r>
+          </a:p>
+        </p:txBody>
+      </p:sp>
+      <p:cxnSp>
+        <p:nvCxnSpPr>
+          <p:cNvPr id="25" name="Straight Arrow Connector 24">
+            <a:extLst>
+              <a:ext uri="{FF2B5EF4-FFF2-40B4-BE49-F238E27FC236}">
+                <a16:creationId xmlns:a16="http://schemas.microsoft.com/office/drawing/2014/main" id="{34F3D95B-D703-BE43-85D4-FC4A848FB7F5}"/>
+              </a:ext>
+            </a:extLst>
+          </p:cNvPr>
+          <p:cNvCxnSpPr>
+            <a:cxnSpLocks/>
+          </p:cNvCxnSpPr>
+          <p:nvPr/>
+        </p:nvCxnSpPr>
+        <p:spPr>
+          <a:xfrm flipH="1">
+            <a:off x="6028862" y="2473642"/>
+            <a:ext cx="1903642" cy="1325563"/>
+          </a:xfrm>
+          <a:prstGeom prst="straightConnector1">
+            <a:avLst/>
+          </a:prstGeom>
+          <a:ln w="50800">
+            <a:headEnd type="triangle"/>
+            <a:tailEnd type="triangle"/>
+          </a:ln>
+        </p:spPr>
+        <p:style>
+          <a:lnRef idx="1">
+            <a:schemeClr val="accent1"/>
+          </a:lnRef>
+          <a:fillRef idx="0">
+            <a:schemeClr val="accent1"/>
+          </a:fillRef>
+          <a:effectRef idx="0">
+            <a:schemeClr val="accent1"/>
+          </a:effectRef>
+          <a:fontRef idx="minor">
+            <a:schemeClr val="tx1"/>
+          </a:fontRef>
+        </p:style>
+      </p:cxnSp>
+      <p:cxnSp>
+        <p:nvCxnSpPr>
+          <p:cNvPr id="27" name="Straight Arrow Connector 26">
+            <a:extLst>
+              <a:ext uri="{FF2B5EF4-FFF2-40B4-BE49-F238E27FC236}">
+                <a16:creationId xmlns:a16="http://schemas.microsoft.com/office/drawing/2014/main" id="{C4119EB5-25D4-834F-8085-D6A77C76F99C}"/>
+              </a:ext>
+            </a:extLst>
+          </p:cNvPr>
+          <p:cNvCxnSpPr>
+            <a:cxnSpLocks/>
+          </p:cNvCxnSpPr>
+          <p:nvPr/>
+        </p:nvCxnSpPr>
+        <p:spPr>
+          <a:xfrm flipH="1" flipV="1">
+            <a:off x="6028863" y="4133459"/>
+            <a:ext cx="1938557" cy="1102491"/>
+          </a:xfrm>
+          <a:prstGeom prst="straightConnector1">
+            <a:avLst/>
+          </a:prstGeom>
+          <a:ln w="50800">
+            <a:headEnd type="triangle"/>
+            <a:tailEnd type="triangle"/>
+          </a:ln>
+        </p:spPr>
+        <p:style>
+          <a:lnRef idx="1">
+            <a:schemeClr val="accent1"/>
+          </a:lnRef>
+          <a:fillRef idx="0">
+            <a:schemeClr val="accent1"/>
+          </a:fillRef>
+          <a:effectRef idx="0">
+            <a:schemeClr val="accent1"/>
+          </a:effectRef>
+          <a:fontRef idx="minor">
+            <a:schemeClr val="tx1"/>
+          </a:fontRef>
+        </p:style>
+      </p:cxnSp>
+      <p:cxnSp>
+        <p:nvCxnSpPr>
+          <p:cNvPr id="30" name="Straight Arrow Connector 29">
+            <a:extLst>
+              <a:ext uri="{FF2B5EF4-FFF2-40B4-BE49-F238E27FC236}">
+                <a16:creationId xmlns:a16="http://schemas.microsoft.com/office/drawing/2014/main" id="{90D8AED8-06FD-8C41-912D-01E873C0132C}"/>
+              </a:ext>
+            </a:extLst>
+          </p:cNvPr>
+          <p:cNvCxnSpPr>
+            <a:cxnSpLocks/>
+          </p:cNvCxnSpPr>
+          <p:nvPr/>
+        </p:nvCxnSpPr>
+        <p:spPr>
+          <a:xfrm flipV="1">
+            <a:off x="9672776" y="3425684"/>
+            <a:ext cx="0" cy="790220"/>
+          </a:xfrm>
+          <a:prstGeom prst="straightConnector1">
+            <a:avLst/>
+          </a:prstGeom>
+          <a:ln w="50800">
+            <a:headEnd type="triangle"/>
+            <a:tailEnd type="triangle"/>
+          </a:ln>
+        </p:spPr>
+        <p:style>
+          <a:lnRef idx="1">
+            <a:schemeClr val="accent1"/>
+          </a:lnRef>
+          <a:fillRef idx="0">
+            <a:schemeClr val="accent1"/>
+          </a:fillRef>
+          <a:effectRef idx="0">
+            <a:schemeClr val="accent1"/>
+          </a:effectRef>
+          <a:fontRef idx="minor">
+            <a:schemeClr val="tx1"/>
+          </a:fontRef>
+        </p:style>
+      </p:cxnSp>
+      <p:pic>
+        <p:nvPicPr>
+          <p:cNvPr id="34" name="Picture 33" descr="Logo, company name&#10;&#10;Description automatically generated">
+            <a:extLst>
+              <a:ext uri="{FF2B5EF4-FFF2-40B4-BE49-F238E27FC236}">
+                <a16:creationId xmlns:a16="http://schemas.microsoft.com/office/drawing/2014/main" id="{879C8B95-66DA-6E42-AA3C-8A51CC54CF23}"/>
+              </a:ext>
+            </a:extLst>
+          </p:cNvPr>
+          <p:cNvPicPr>
+            <a:picLocks noChangeAspect="1"/>
+          </p:cNvPicPr>
+          <p:nvPr/>
+        </p:nvPicPr>
+        <p:blipFill>
+          <a:blip r:embed="rId8"/>
+          <a:stretch>
+            <a:fillRect/>
+          </a:stretch>
+        </p:blipFill>
+        <p:spPr>
+          <a:xfrm>
+            <a:off x="3199152" y="3373014"/>
+            <a:ext cx="1021726" cy="510863"/>
+          </a:xfrm>
+          <a:prstGeom prst="rect">
+            <a:avLst/>
+          </a:prstGeom>
+        </p:spPr>
+      </p:pic>
+      <p:pic>
+        <p:nvPicPr>
+          <p:cNvPr id="36" name="Graphic 35">
+            <a:extLst>
+              <a:ext uri="{FF2B5EF4-FFF2-40B4-BE49-F238E27FC236}">
+                <a16:creationId xmlns:a16="http://schemas.microsoft.com/office/drawing/2014/main" id="{4B6F6D7B-00DC-4B4F-8902-1E6BF88B9947}"/>
+              </a:ext>
+            </a:extLst>
+          </p:cNvPr>
+          <p:cNvPicPr>
+            <a:picLocks noChangeAspect="1"/>
+          </p:cNvPicPr>
+          <p:nvPr/>
+        </p:nvPicPr>
+        <p:blipFill>
+          <a:blip r:embed="rId9">
+            <a:extLst>
+              <a:ext uri="{96DAC541-7B7A-43D3-8B79-37D633B846F1}">
+                <asvg:svgBlip xmlns:asvg="http://schemas.microsoft.com/office/drawing/2016/SVG/main" r:embed="rId10"/>
+              </a:ext>
+            </a:extLst>
+          </a:blip>
+          <a:stretch>
+            <a:fillRect/>
+          </a:stretch>
+        </p:blipFill>
+        <p:spPr>
+          <a:xfrm>
+            <a:off x="4172669" y="3281949"/>
+            <a:ext cx="1617739" cy="553344"/>
+          </a:xfrm>
+          <a:prstGeom prst="rect">
+            <a:avLst/>
+          </a:prstGeom>
+        </p:spPr>
+      </p:pic>
     </p:spTree>
     <p:extLst>
       <p:ext uri="{BB962C8B-B14F-4D97-AF65-F5344CB8AC3E}">

</xml_diff>